<commit_message>
support for tables and hyperlinks in XSLF
git-svn-id: https://svn.apache.org/repos/asf/poi/trunk@1158611 13f79535-47bb-0310-9956-ffa450edef68
</commit_message>
<xml_diff>
--- a/test-data/slideshow/shapes.pptx
+++ b/test-data/slideshow/shapes.pptx
@@ -8,6 +8,8 @@
     <p:sldId id="256" r:id="rId2"/>
     <p:sldId id="258" r:id="rId3"/>
     <p:sldId id="257" r:id="rId4"/>
+    <p:sldId id="259" r:id="rId5"/>
+    <p:sldId id="260" r:id="rId6"/>
   </p:sldIdLst>
   <p:sldSz cx="9144000" cy="6858000" type="screen4x3"/>
   <p:notesSz cx="6858000" cy="9144000"/>
@@ -291,7 +293,7 @@
             <a:fld id="{1D8BD707-D9CF-40AE-B4C6-C98DA3205C09}" type="datetimeFigureOut">
               <a:rPr lang="en-US" smtClean="0"/>
               <a:pPr/>
-              <a:t>8/2/2011</a:t>
+              <a:t>8/17/2011</a:t>
             </a:fld>
             <a:endParaRPr lang="en-US"/>
           </a:p>
@@ -458,7 +460,7 @@
             <a:fld id="{1D8BD707-D9CF-40AE-B4C6-C98DA3205C09}" type="datetimeFigureOut">
               <a:rPr lang="en-US" smtClean="0"/>
               <a:pPr/>
-              <a:t>8/2/2011</a:t>
+              <a:t>8/17/2011</a:t>
             </a:fld>
             <a:endParaRPr lang="en-US"/>
           </a:p>
@@ -635,7 +637,7 @@
             <a:fld id="{1D8BD707-D9CF-40AE-B4C6-C98DA3205C09}" type="datetimeFigureOut">
               <a:rPr lang="en-US" smtClean="0"/>
               <a:pPr/>
-              <a:t>8/2/2011</a:t>
+              <a:t>8/17/2011</a:t>
             </a:fld>
             <a:endParaRPr lang="en-US"/>
           </a:p>
@@ -802,7 +804,7 @@
             <a:fld id="{1D8BD707-D9CF-40AE-B4C6-C98DA3205C09}" type="datetimeFigureOut">
               <a:rPr lang="en-US" smtClean="0"/>
               <a:pPr/>
-              <a:t>8/2/2011</a:t>
+              <a:t>8/17/2011</a:t>
             </a:fld>
             <a:endParaRPr lang="en-US"/>
           </a:p>
@@ -1045,7 +1047,7 @@
             <a:fld id="{1D8BD707-D9CF-40AE-B4C6-C98DA3205C09}" type="datetimeFigureOut">
               <a:rPr lang="en-US" smtClean="0"/>
               <a:pPr/>
-              <a:t>8/2/2011</a:t>
+              <a:t>8/17/2011</a:t>
             </a:fld>
             <a:endParaRPr lang="en-US"/>
           </a:p>
@@ -1330,7 +1332,7 @@
             <a:fld id="{1D8BD707-D9CF-40AE-B4C6-C98DA3205C09}" type="datetimeFigureOut">
               <a:rPr lang="en-US" smtClean="0"/>
               <a:pPr/>
-              <a:t>8/2/2011</a:t>
+              <a:t>8/17/2011</a:t>
             </a:fld>
             <a:endParaRPr lang="en-US"/>
           </a:p>
@@ -1749,7 +1751,7 @@
             <a:fld id="{1D8BD707-D9CF-40AE-B4C6-C98DA3205C09}" type="datetimeFigureOut">
               <a:rPr lang="en-US" smtClean="0"/>
               <a:pPr/>
-              <a:t>8/2/2011</a:t>
+              <a:t>8/17/2011</a:t>
             </a:fld>
             <a:endParaRPr lang="en-US"/>
           </a:p>
@@ -1864,7 +1866,7 @@
             <a:fld id="{1D8BD707-D9CF-40AE-B4C6-C98DA3205C09}" type="datetimeFigureOut">
               <a:rPr lang="en-US" smtClean="0"/>
               <a:pPr/>
-              <a:t>8/2/2011</a:t>
+              <a:t>8/17/2011</a:t>
             </a:fld>
             <a:endParaRPr lang="en-US"/>
           </a:p>
@@ -1956,7 +1958,7 @@
             <a:fld id="{1D8BD707-D9CF-40AE-B4C6-C98DA3205C09}" type="datetimeFigureOut">
               <a:rPr lang="en-US" smtClean="0"/>
               <a:pPr/>
-              <a:t>8/2/2011</a:t>
+              <a:t>8/17/2011</a:t>
             </a:fld>
             <a:endParaRPr lang="en-US"/>
           </a:p>
@@ -2230,7 +2232,7 @@
             <a:fld id="{1D8BD707-D9CF-40AE-B4C6-C98DA3205C09}" type="datetimeFigureOut">
               <a:rPr lang="en-US" smtClean="0"/>
               <a:pPr/>
-              <a:t>8/2/2011</a:t>
+              <a:t>8/17/2011</a:t>
             </a:fld>
             <a:endParaRPr lang="en-US"/>
           </a:p>
@@ -2480,7 +2482,7 @@
             <a:fld id="{1D8BD707-D9CF-40AE-B4C6-C98DA3205C09}" type="datetimeFigureOut">
               <a:rPr lang="en-US" smtClean="0"/>
               <a:pPr/>
-              <a:t>8/2/2011</a:t>
+              <a:t>8/17/2011</a:t>
             </a:fld>
             <a:endParaRPr lang="en-US"/>
           </a:p>
@@ -2690,7 +2692,7 @@
             <a:fld id="{1D8BD707-D9CF-40AE-B4C6-C98DA3205C09}" type="datetimeFigureOut">
               <a:rPr lang="en-US" smtClean="0"/>
               <a:pPr/>
-              <a:t>8/2/2011</a:t>
+              <a:t>8/17/2011</a:t>
             </a:fld>
             <a:endParaRPr lang="en-US"/>
           </a:p>
@@ -4189,6 +4191,567 @@
 </p:sld>
 </file>
 
+<file path=ppt/slides/slide4.xml><?xml version="1.0" encoding="utf-8"?>
+<p:sld xmlns:a="http://schemas.openxmlformats.org/drawingml/2006/main" xmlns:r="http://schemas.openxmlformats.org/officeDocument/2006/relationships" xmlns:p="http://schemas.openxmlformats.org/presentationml/2006/main">
+  <p:cSld>
+    <p:spTree>
+      <p:nvGrpSpPr>
+        <p:cNvPr id="1" name=""/>
+        <p:cNvGrpSpPr/>
+        <p:nvPr/>
+      </p:nvGrpSpPr>
+      <p:grpSpPr>
+        <a:xfrm>
+          <a:off x="0" y="0"/>
+          <a:ext cx="0" cy="0"/>
+          <a:chOff x="0" y="0"/>
+          <a:chExt cx="0" cy="0"/>
+        </a:xfrm>
+      </p:grpSpPr>
+      <p:graphicFrame>
+        <p:nvGraphicFramePr>
+          <p:cNvPr id="2" name="Table 1"/>
+          <p:cNvGraphicFramePr>
+            <a:graphicFrameLocks noGrp="1"/>
+          </p:cNvGraphicFramePr>
+          <p:nvPr>
+            <p:extLst>
+              <p:ext uri="{D42A27DB-BD31-4B8C-83A1-F6EECF244321}">
+                <p14:modId xmlns:p14="http://schemas.microsoft.com/office/powerpoint/2010/main" val="2055524198"/>
+              </p:ext>
+            </p:extLst>
+          </p:nvPr>
+        </p:nvGraphicFramePr>
+        <p:xfrm>
+          <a:off x="1524000" y="1397000"/>
+          <a:ext cx="6096000" cy="2225040"/>
+        </p:xfrm>
+        <a:graphic>
+          <a:graphicData uri="http://schemas.openxmlformats.org/drawingml/2006/table">
+            <a:tbl>
+              <a:tblPr firstRow="1" bandRow="1">
+                <a:tableStyleId>{5940675A-B579-460E-94D1-54222C63F5DA}</a:tableStyleId>
+              </a:tblPr>
+              <a:tblGrid>
+                <a:gridCol w="1143000"/>
+                <a:gridCol w="3048000"/>
+                <a:gridCol w="1905000"/>
+              </a:tblGrid>
+              <a:tr h="370840">
+                <a:tc>
+                  <a:txBody>
+                    <a:bodyPr/>
+                    <a:lstStyle/>
+                    <a:p>
+                      <a:r>
+                        <a:rPr lang="en-US" b="1" dirty="0" smtClean="0"/>
+                        <a:t>header1</a:t>
+                      </a:r>
+                      <a:endParaRPr lang="en-US" b="1" dirty="0"/>
+                    </a:p>
+                  </a:txBody>
+                  <a:tcPr>
+                    <a:solidFill>
+                      <a:schemeClr val="accent1">
+                        <a:lumMod val="20000"/>
+                        <a:lumOff val="80000"/>
+                      </a:schemeClr>
+                    </a:solidFill>
+                  </a:tcPr>
+                </a:tc>
+                <a:tc>
+                  <a:txBody>
+                    <a:bodyPr/>
+                    <a:lstStyle/>
+                    <a:p>
+                      <a:r>
+                        <a:rPr lang="en-US" b="1" dirty="0" smtClean="0"/>
+                        <a:t>header2</a:t>
+                      </a:r>
+                      <a:endParaRPr lang="en-US" b="1" dirty="0"/>
+                    </a:p>
+                  </a:txBody>
+                  <a:tcPr>
+                    <a:solidFill>
+                      <a:schemeClr val="accent1">
+                        <a:lumMod val="20000"/>
+                        <a:lumOff val="80000"/>
+                      </a:schemeClr>
+                    </a:solidFill>
+                  </a:tcPr>
+                </a:tc>
+                <a:tc>
+                  <a:txBody>
+                    <a:bodyPr/>
+                    <a:lstStyle/>
+                    <a:p>
+                      <a:r>
+                        <a:rPr lang="en-US" b="1" dirty="0" smtClean="0"/>
+                        <a:t>header3</a:t>
+                      </a:r>
+                      <a:endParaRPr lang="en-US" b="1" dirty="0"/>
+                    </a:p>
+                  </a:txBody>
+                  <a:tcPr>
+                    <a:solidFill>
+                      <a:schemeClr val="accent1">
+                        <a:lumMod val="20000"/>
+                        <a:lumOff val="80000"/>
+                      </a:schemeClr>
+                    </a:solidFill>
+                  </a:tcPr>
+                </a:tc>
+              </a:tr>
+              <a:tr h="370840">
+                <a:tc>
+                  <a:txBody>
+                    <a:bodyPr/>
+                    <a:lstStyle/>
+                    <a:p>
+                      <a:r>
+                        <a:rPr lang="en-US" dirty="0" smtClean="0"/>
+                        <a:t>A1</a:t>
+                      </a:r>
+                      <a:endParaRPr lang="en-US" dirty="0"/>
+                    </a:p>
+                  </a:txBody>
+                  <a:tcPr/>
+                </a:tc>
+                <a:tc>
+                  <a:txBody>
+                    <a:bodyPr/>
+                    <a:lstStyle/>
+                    <a:p>
+                      <a:r>
+                        <a:rPr lang="en-US" dirty="0" smtClean="0"/>
+                        <a:t>B1</a:t>
+                      </a:r>
+                      <a:endParaRPr lang="en-US" dirty="0"/>
+                    </a:p>
+                  </a:txBody>
+                  <a:tcPr/>
+                </a:tc>
+                <a:tc>
+                  <a:txBody>
+                    <a:bodyPr/>
+                    <a:lstStyle/>
+                    <a:p>
+                      <a:r>
+                        <a:rPr lang="en-US" dirty="0" smtClean="0"/>
+                        <a:t>C1</a:t>
+                      </a:r>
+                      <a:endParaRPr lang="en-US" dirty="0"/>
+                    </a:p>
+                  </a:txBody>
+                  <a:tcPr/>
+                </a:tc>
+              </a:tr>
+              <a:tr h="370840">
+                <a:tc>
+                  <a:txBody>
+                    <a:bodyPr/>
+                    <a:lstStyle/>
+                    <a:p>
+                      <a:r>
+                        <a:rPr lang="en-US" dirty="0" smtClean="0"/>
+                        <a:t>A2</a:t>
+                      </a:r>
+                      <a:endParaRPr lang="en-US" dirty="0"/>
+                    </a:p>
+                  </a:txBody>
+                  <a:tcPr/>
+                </a:tc>
+                <a:tc>
+                  <a:txBody>
+                    <a:bodyPr/>
+                    <a:lstStyle/>
+                    <a:p>
+                      <a:endParaRPr lang="en-US" dirty="0"/>
+                    </a:p>
+                  </a:txBody>
+                  <a:tcPr/>
+                </a:tc>
+                <a:tc>
+                  <a:txBody>
+                    <a:bodyPr/>
+                    <a:lstStyle/>
+                    <a:p>
+                      <a:endParaRPr lang="en-US" dirty="0"/>
+                    </a:p>
+                  </a:txBody>
+                  <a:tcPr/>
+                </a:tc>
+              </a:tr>
+              <a:tr h="370840">
+                <a:tc>
+                  <a:txBody>
+                    <a:bodyPr/>
+                    <a:lstStyle/>
+                    <a:p>
+                      <a:r>
+                        <a:rPr lang="en-US" dirty="0" smtClean="0"/>
+                        <a:t>A3</a:t>
+                      </a:r>
+                      <a:endParaRPr lang="en-US" dirty="0"/>
+                    </a:p>
+                  </a:txBody>
+                  <a:tcPr/>
+                </a:tc>
+                <a:tc gridSpan="2">
+                  <a:txBody>
+                    <a:bodyPr/>
+                    <a:lstStyle/>
+                    <a:p>
+                      <a:r>
+                        <a:rPr lang="en-US" dirty="0" smtClean="0"/>
+                        <a:t>B3 and C3 are merged</a:t>
+                      </a:r>
+                      <a:endParaRPr lang="en-US" dirty="0"/>
+                    </a:p>
+                  </a:txBody>
+                  <a:tcPr/>
+                </a:tc>
+                <a:tc hMerge="1">
+                  <a:txBody>
+                    <a:bodyPr/>
+                    <a:lstStyle/>
+                    <a:p>
+                      <a:endParaRPr lang="en-US" dirty="0"/>
+                    </a:p>
+                  </a:txBody>
+                  <a:tcPr/>
+                </a:tc>
+              </a:tr>
+              <a:tr h="370840">
+                <a:tc>
+                  <a:txBody>
+                    <a:bodyPr/>
+                    <a:lstStyle/>
+                    <a:p>
+                      <a:r>
+                        <a:rPr lang="en-US" dirty="0" smtClean="0"/>
+                        <a:t>A4</a:t>
+                      </a:r>
+                      <a:endParaRPr lang="en-US" dirty="0"/>
+                    </a:p>
+                  </a:txBody>
+                  <a:tcPr/>
+                </a:tc>
+                <a:tc gridSpan="2">
+                  <a:txBody>
+                    <a:bodyPr/>
+                    <a:lstStyle/>
+                    <a:p>
+                      <a:endParaRPr lang="en-US" dirty="0"/>
+                    </a:p>
+                  </a:txBody>
+                  <a:tcPr/>
+                </a:tc>
+                <a:tc hMerge="1">
+                  <a:txBody>
+                    <a:bodyPr/>
+                    <a:lstStyle/>
+                    <a:p>
+                      <a:endParaRPr lang="en-US"/>
+                    </a:p>
+                  </a:txBody>
+                  <a:tcPr/>
+                </a:tc>
+              </a:tr>
+              <a:tr h="370840">
+                <a:tc>
+                  <a:txBody>
+                    <a:bodyPr/>
+                    <a:lstStyle/>
+                    <a:p>
+                      <a:r>
+                        <a:rPr lang="en-US" dirty="0" smtClean="0"/>
+                        <a:t>A5</a:t>
+                      </a:r>
+                      <a:endParaRPr lang="en-US" dirty="0"/>
+                    </a:p>
+                  </a:txBody>
+                  <a:tcPr/>
+                </a:tc>
+                <a:tc gridSpan="2">
+                  <a:txBody>
+                    <a:bodyPr/>
+                    <a:lstStyle/>
+                    <a:p>
+                      <a:endParaRPr lang="en-US" dirty="0"/>
+                    </a:p>
+                  </a:txBody>
+                  <a:tcPr/>
+                </a:tc>
+                <a:tc hMerge="1">
+                  <a:txBody>
+                    <a:bodyPr/>
+                    <a:lstStyle/>
+                    <a:p>
+                      <a:endParaRPr lang="en-US"/>
+                    </a:p>
+                  </a:txBody>
+                  <a:tcPr/>
+                </a:tc>
+              </a:tr>
+            </a:tbl>
+          </a:graphicData>
+        </a:graphic>
+      </p:graphicFrame>
+    </p:spTree>
+    <p:extLst>
+      <p:ext uri="{BB962C8B-B14F-4D97-AF65-F5344CB8AC3E}">
+        <p14:creationId xmlns:p14="http://schemas.microsoft.com/office/powerpoint/2010/main" val="1492462418"/>
+      </p:ext>
+    </p:extLst>
+  </p:cSld>
+  <p:clrMapOvr>
+    <a:masterClrMapping/>
+  </p:clrMapOvr>
+</p:sld>
+</file>
+
+<file path=ppt/slides/slide5.xml><?xml version="1.0" encoding="utf-8"?>
+<p:sld xmlns:a="http://schemas.openxmlformats.org/drawingml/2006/main" xmlns:r="http://schemas.openxmlformats.org/officeDocument/2006/relationships" xmlns:p="http://schemas.openxmlformats.org/presentationml/2006/main">
+  <p:cSld>
+    <p:spTree>
+      <p:nvGrpSpPr>
+        <p:cNvPr id="1" name=""/>
+        <p:cNvGrpSpPr/>
+        <p:nvPr/>
+      </p:nvGrpSpPr>
+      <p:grpSpPr>
+        <a:xfrm>
+          <a:off x="0" y="0"/>
+          <a:ext cx="0" cy="0"/>
+          <a:chOff x="0" y="0"/>
+          <a:chExt cx="0" cy="0"/>
+        </a:xfrm>
+      </p:grpSpPr>
+      <p:graphicFrame>
+        <p:nvGraphicFramePr>
+          <p:cNvPr id="2" name="Table 1"/>
+          <p:cNvGraphicFramePr>
+            <a:graphicFrameLocks noGrp="1"/>
+          </p:cNvGraphicFramePr>
+          <p:nvPr>
+            <p:extLst>
+              <p:ext uri="{D42A27DB-BD31-4B8C-83A1-F6EECF244321}">
+                <p14:modId xmlns:p14="http://schemas.microsoft.com/office/powerpoint/2010/main" val="1424815358"/>
+              </p:ext>
+            </p:extLst>
+          </p:nvPr>
+        </p:nvGraphicFramePr>
+        <p:xfrm>
+          <a:off x="685800" y="2133600"/>
+          <a:ext cx="7848600" cy="1854200"/>
+        </p:xfrm>
+        <a:graphic>
+          <a:graphicData uri="http://schemas.openxmlformats.org/drawingml/2006/table">
+            <a:tbl>
+              <a:tblPr firstRow="1" bandRow="1">
+                <a:tableStyleId>{5C22544A-7EE6-4342-B048-85BDC9FD1C3A}</a:tableStyleId>
+              </a:tblPr>
+              <a:tblGrid>
+                <a:gridCol w="2589229"/>
+                <a:gridCol w="5259371"/>
+              </a:tblGrid>
+              <a:tr h="370840">
+                <a:tc>
+                  <a:txBody>
+                    <a:bodyPr/>
+                    <a:lstStyle/>
+                    <a:p>
+                      <a:r>
+                        <a:rPr lang="en-US" dirty="0" smtClean="0"/>
+                        <a:t>Link Type</a:t>
+                      </a:r>
+                      <a:endParaRPr lang="en-US" dirty="0"/>
+                    </a:p>
+                  </a:txBody>
+                  <a:tcPr/>
+                </a:tc>
+                <a:tc>
+                  <a:txBody>
+                    <a:bodyPr/>
+                    <a:lstStyle/>
+                    <a:p>
+                      <a:r>
+                        <a:rPr lang="en-US" dirty="0" smtClean="0"/>
+                        <a:t>Target URI</a:t>
+                      </a:r>
+                      <a:endParaRPr lang="en-US" dirty="0"/>
+                    </a:p>
+                  </a:txBody>
+                  <a:tcPr/>
+                </a:tc>
+              </a:tr>
+              <a:tr h="370840">
+                <a:tc>
+                  <a:txBody>
+                    <a:bodyPr/>
+                    <a:lstStyle/>
+                    <a:p>
+                      <a:r>
+                        <a:rPr lang="en-US" dirty="0" smtClean="0">
+                          <a:hlinkClick r:id="rId2"/>
+                        </a:rPr>
+                        <a:t>Web Page</a:t>
+                      </a:r>
+                      <a:endParaRPr lang="en-US" dirty="0"/>
+                    </a:p>
+                  </a:txBody>
+                  <a:tcPr/>
+                </a:tc>
+                <a:tc>
+                  <a:txBody>
+                    <a:bodyPr/>
+                    <a:lstStyle/>
+                    <a:p>
+                      <a:r>
+                        <a:rPr lang="en-US" dirty="0" smtClean="0"/>
+                        <a:t>http://poi.apache.org/</a:t>
+                      </a:r>
+                      <a:endParaRPr lang="en-US" dirty="0"/>
+                    </a:p>
+                  </a:txBody>
+                  <a:tcPr/>
+                </a:tc>
+              </a:tr>
+              <a:tr h="370840">
+                <a:tc>
+                  <a:txBody>
+                    <a:bodyPr/>
+                    <a:lstStyle/>
+                    <a:p>
+                      <a:r>
+                        <a:rPr lang="en-US" dirty="0" smtClean="0">
+                          <a:hlinkClick r:id="rId3" action="ppaction://hlinksldjump"/>
+                        </a:rPr>
+                        <a:t>Place in this document</a:t>
+                      </a:r>
+                      <a:endParaRPr lang="en-US" dirty="0"/>
+                    </a:p>
+                  </a:txBody>
+                  <a:tcPr/>
+                </a:tc>
+                <a:tc>
+                  <a:txBody>
+                    <a:bodyPr/>
+                    <a:lstStyle/>
+                    <a:p>
+                      <a:r>
+                        <a:rPr lang="en-US" dirty="0" smtClean="0"/>
+                        <a:t>/</a:t>
+                      </a:r>
+                      <a:r>
+                        <a:rPr lang="en-US" dirty="0" err="1" smtClean="0"/>
+                        <a:t>ppt</a:t>
+                      </a:r>
+                      <a:r>
+                        <a:rPr lang="en-US" dirty="0" smtClean="0"/>
+                        <a:t>/slides/slide2.xml</a:t>
+                      </a:r>
+                      <a:endParaRPr lang="en-US" dirty="0"/>
+                    </a:p>
+                  </a:txBody>
+                  <a:tcPr/>
+                </a:tc>
+              </a:tr>
+              <a:tr h="370840">
+                <a:tc>
+                  <a:txBody>
+                    <a:bodyPr/>
+                    <a:lstStyle/>
+                    <a:p>
+                      <a:r>
+                        <a:rPr lang="en-US" dirty="0" smtClean="0">
+                          <a:hlinkClick r:id="rId4"/>
+                        </a:rPr>
+                        <a:t>Email</a:t>
+                      </a:r>
+                      <a:endParaRPr lang="en-US" dirty="0"/>
+                    </a:p>
+                  </a:txBody>
+                  <a:tcPr/>
+                </a:tc>
+                <a:tc>
+                  <a:txBody>
+                    <a:bodyPr/>
+                    <a:lstStyle/>
+                    <a:p>
+                      <a:r>
+                        <a:rPr lang="en-US" dirty="0" smtClean="0"/>
+                        <a:t>mailto:dev@poi.apache.org?subject=Hi%20There</a:t>
+                      </a:r>
+                      <a:endParaRPr lang="en-US" dirty="0"/>
+                    </a:p>
+                  </a:txBody>
+                  <a:tcPr/>
+                </a:tc>
+              </a:tr>
+              <a:tr h="370840">
+                <a:tc>
+                  <a:txBody>
+                    <a:bodyPr/>
+                    <a:lstStyle/>
+                    <a:p>
+                      <a:endParaRPr lang="en-US" dirty="0"/>
+                    </a:p>
+                  </a:txBody>
+                  <a:tcPr/>
+                </a:tc>
+                <a:tc>
+                  <a:txBody>
+                    <a:bodyPr/>
+                    <a:lstStyle/>
+                    <a:p>
+                      <a:endParaRPr lang="en-US" dirty="0"/>
+                    </a:p>
+                  </a:txBody>
+                  <a:tcPr/>
+                </a:tc>
+              </a:tr>
+            </a:tbl>
+          </a:graphicData>
+        </a:graphic>
+      </p:graphicFrame>
+      <p:sp>
+        <p:nvSpPr>
+          <p:cNvPr id="3" name="Title 2"/>
+          <p:cNvSpPr>
+            <a:spLocks noGrp="1"/>
+          </p:cNvSpPr>
+          <p:nvPr>
+            <p:ph type="title"/>
+          </p:nvPr>
+        </p:nvSpPr>
+        <p:spPr/>
+        <p:txBody>
+          <a:bodyPr/>
+          <a:lstStyle/>
+          <a:p>
+            <a:r>
+              <a:rPr lang="en-US" dirty="0" smtClean="0"/>
+              <a:t>Hyperlinks</a:t>
+            </a:r>
+            <a:endParaRPr lang="en-US" dirty="0"/>
+          </a:p>
+        </p:txBody>
+      </p:sp>
+    </p:spTree>
+    <p:extLst>
+      <p:ext uri="{BB962C8B-B14F-4D97-AF65-F5344CB8AC3E}">
+        <p14:creationId xmlns:p14="http://schemas.microsoft.com/office/powerpoint/2010/main" val="3472613033"/>
+      </p:ext>
+    </p:extLst>
+  </p:cSld>
+  <p:clrMapOvr>
+    <a:masterClrMapping/>
+  </p:clrMapOvr>
+</p:sld>
+</file>
+
 <file path=ppt/theme/theme1.xml><?xml version="1.0" encoding="utf-8"?>
 <a:theme xmlns:a="http://schemas.openxmlformats.org/drawingml/2006/main" name="Office Theme">
   <a:themeElements>

</xml_diff>

<commit_message>
initial support for rendering pptx slides into images with a PPTX2PNG command-line utility
git-svn-id: https://svn.apache.org/repos/asf/poi/trunk@1187328 13f79535-47bb-0310-9956-ffa450edef68
</commit_message>
<xml_diff>
--- a/test-data/slideshow/shapes.pptx
+++ b/test-data/slideshow/shapes.pptx
@@ -10,6 +10,7 @@
     <p:sldId id="257" r:id="rId4"/>
     <p:sldId id="259" r:id="rId5"/>
     <p:sldId id="260" r:id="rId6"/>
+    <p:sldId id="261" r:id="rId7"/>
   </p:sldIdLst>
   <p:sldSz cx="9144000" cy="6858000" type="screen4x3"/>
   <p:notesSz cx="6858000" cy="9144000"/>
@@ -293,7 +294,7 @@
             <a:fld id="{1D8BD707-D9CF-40AE-B4C6-C98DA3205C09}" type="datetimeFigureOut">
               <a:rPr lang="en-US" smtClean="0"/>
               <a:pPr/>
-              <a:t>8/17/2011</a:t>
+              <a:t>10/17/2011</a:t>
             </a:fld>
             <a:endParaRPr lang="en-US"/>
           </a:p>
@@ -460,7 +461,7 @@
             <a:fld id="{1D8BD707-D9CF-40AE-B4C6-C98DA3205C09}" type="datetimeFigureOut">
               <a:rPr lang="en-US" smtClean="0"/>
               <a:pPr/>
-              <a:t>8/17/2011</a:t>
+              <a:t>10/17/2011</a:t>
             </a:fld>
             <a:endParaRPr lang="en-US"/>
           </a:p>
@@ -637,7 +638,7 @@
             <a:fld id="{1D8BD707-D9CF-40AE-B4C6-C98DA3205C09}" type="datetimeFigureOut">
               <a:rPr lang="en-US" smtClean="0"/>
               <a:pPr/>
-              <a:t>8/17/2011</a:t>
+              <a:t>10/17/2011</a:t>
             </a:fld>
             <a:endParaRPr lang="en-US"/>
           </a:p>
@@ -804,7 +805,7 @@
             <a:fld id="{1D8BD707-D9CF-40AE-B4C6-C98DA3205C09}" type="datetimeFigureOut">
               <a:rPr lang="en-US" smtClean="0"/>
               <a:pPr/>
-              <a:t>8/17/2011</a:t>
+              <a:t>10/17/2011</a:t>
             </a:fld>
             <a:endParaRPr lang="en-US"/>
           </a:p>
@@ -1047,7 +1048,7 @@
             <a:fld id="{1D8BD707-D9CF-40AE-B4C6-C98DA3205C09}" type="datetimeFigureOut">
               <a:rPr lang="en-US" smtClean="0"/>
               <a:pPr/>
-              <a:t>8/17/2011</a:t>
+              <a:t>10/17/2011</a:t>
             </a:fld>
             <a:endParaRPr lang="en-US"/>
           </a:p>
@@ -1332,7 +1333,7 @@
             <a:fld id="{1D8BD707-D9CF-40AE-B4C6-C98DA3205C09}" type="datetimeFigureOut">
               <a:rPr lang="en-US" smtClean="0"/>
               <a:pPr/>
-              <a:t>8/17/2011</a:t>
+              <a:t>10/17/2011</a:t>
             </a:fld>
             <a:endParaRPr lang="en-US"/>
           </a:p>
@@ -1751,7 +1752,7 @@
             <a:fld id="{1D8BD707-D9CF-40AE-B4C6-C98DA3205C09}" type="datetimeFigureOut">
               <a:rPr lang="en-US" smtClean="0"/>
               <a:pPr/>
-              <a:t>8/17/2011</a:t>
+              <a:t>10/17/2011</a:t>
             </a:fld>
             <a:endParaRPr lang="en-US"/>
           </a:p>
@@ -1866,7 +1867,7 @@
             <a:fld id="{1D8BD707-D9CF-40AE-B4C6-C98DA3205C09}" type="datetimeFigureOut">
               <a:rPr lang="en-US" smtClean="0"/>
               <a:pPr/>
-              <a:t>8/17/2011</a:t>
+              <a:t>10/17/2011</a:t>
             </a:fld>
             <a:endParaRPr lang="en-US"/>
           </a:p>
@@ -1958,7 +1959,7 @@
             <a:fld id="{1D8BD707-D9CF-40AE-B4C6-C98DA3205C09}" type="datetimeFigureOut">
               <a:rPr lang="en-US" smtClean="0"/>
               <a:pPr/>
-              <a:t>8/17/2011</a:t>
+              <a:t>10/17/2011</a:t>
             </a:fld>
             <a:endParaRPr lang="en-US"/>
           </a:p>
@@ -2232,7 +2233,7 @@
             <a:fld id="{1D8BD707-D9CF-40AE-B4C6-C98DA3205C09}" type="datetimeFigureOut">
               <a:rPr lang="en-US" smtClean="0"/>
               <a:pPr/>
-              <a:t>8/17/2011</a:t>
+              <a:t>10/17/2011</a:t>
             </a:fld>
             <a:endParaRPr lang="en-US"/>
           </a:p>
@@ -2482,7 +2483,7 @@
             <a:fld id="{1D8BD707-D9CF-40AE-B4C6-C98DA3205C09}" type="datetimeFigureOut">
               <a:rPr lang="en-US" smtClean="0"/>
               <a:pPr/>
-              <a:t>8/17/2011</a:t>
+              <a:t>10/17/2011</a:t>
             </a:fld>
             <a:endParaRPr lang="en-US"/>
           </a:p>
@@ -2692,7 +2693,7 @@
             <a:fld id="{1D8BD707-D9CF-40AE-B4C6-C98DA3205C09}" type="datetimeFigureOut">
               <a:rPr lang="en-US" smtClean="0"/>
               <a:pPr/>
-              <a:t>8/17/2011</a:t>
+              <a:t>10/17/2011</a:t>
             </a:fld>
             <a:endParaRPr lang="en-US"/>
           </a:p>
@@ -4752,6 +4753,304 @@
 </p:sld>
 </file>
 
+<file path=ppt/slides/slide6.xml><?xml version="1.0" encoding="utf-8"?>
+<p:sld xmlns:a="http://schemas.openxmlformats.org/drawingml/2006/main" xmlns:r="http://schemas.openxmlformats.org/officeDocument/2006/relationships" xmlns:p="http://schemas.openxmlformats.org/presentationml/2006/main">
+  <p:cSld>
+    <p:spTree>
+      <p:nvGrpSpPr>
+        <p:cNvPr id="1" name=""/>
+        <p:cNvGrpSpPr/>
+        <p:nvPr/>
+      </p:nvGrpSpPr>
+      <p:grpSpPr>
+        <a:xfrm>
+          <a:off x="0" y="0"/>
+          <a:ext cx="0" cy="0"/>
+          <a:chOff x="0" y="0"/>
+          <a:chExt cx="0" cy="0"/>
+        </a:xfrm>
+      </p:grpSpPr>
+      <p:sp>
+        <p:nvSpPr>
+          <p:cNvPr id="2" name="Rectangle 1"/>
+          <p:cNvSpPr/>
+          <p:nvPr/>
+        </p:nvSpPr>
+        <p:spPr>
+          <a:xfrm>
+            <a:off x="838200" y="914400"/>
+            <a:ext cx="914400" cy="914400"/>
+          </a:xfrm>
+          <a:prstGeom prst="rect">
+            <a:avLst/>
+          </a:prstGeom>
+        </p:spPr>
+        <p:style>
+          <a:lnRef idx="2">
+            <a:schemeClr val="accent1">
+              <a:shade val="50000"/>
+            </a:schemeClr>
+          </a:lnRef>
+          <a:fillRef idx="1">
+            <a:schemeClr val="accent1"/>
+          </a:fillRef>
+          <a:effectRef idx="0">
+            <a:schemeClr val="accent1"/>
+          </a:effectRef>
+          <a:fontRef idx="minor">
+            <a:schemeClr val="lt1"/>
+          </a:fontRef>
+        </p:style>
+        <p:txBody>
+          <a:bodyPr rtlCol="0" anchor="ctr"/>
+          <a:lstStyle/>
+          <a:p>
+            <a:pPr algn="ctr"/>
+            <a:endParaRPr lang="en-US"/>
+          </a:p>
+        </p:txBody>
+      </p:sp>
+      <p:sp>
+        <p:nvSpPr>
+          <p:cNvPr id="9" name="Rectangle 8"/>
+          <p:cNvSpPr/>
+          <p:nvPr/>
+        </p:nvSpPr>
+        <p:spPr>
+          <a:xfrm>
+            <a:off x="2209800" y="914400"/>
+            <a:ext cx="914400" cy="914400"/>
+          </a:xfrm>
+          <a:prstGeom prst="rect">
+            <a:avLst/>
+          </a:prstGeom>
+          <a:solidFill>
+            <a:schemeClr val="accent1">
+              <a:lumMod val="20000"/>
+              <a:lumOff val="80000"/>
+            </a:schemeClr>
+          </a:solidFill>
+        </p:spPr>
+        <p:style>
+          <a:lnRef idx="2">
+            <a:schemeClr val="accent1">
+              <a:shade val="50000"/>
+            </a:schemeClr>
+          </a:lnRef>
+          <a:fillRef idx="1">
+            <a:schemeClr val="accent1"/>
+          </a:fillRef>
+          <a:effectRef idx="0">
+            <a:schemeClr val="accent1"/>
+          </a:effectRef>
+          <a:fontRef idx="minor">
+            <a:schemeClr val="lt1"/>
+          </a:fontRef>
+        </p:style>
+        <p:txBody>
+          <a:bodyPr rtlCol="0" anchor="ctr"/>
+          <a:lstStyle/>
+          <a:p>
+            <a:pPr algn="ctr"/>
+            <a:endParaRPr lang="en-US"/>
+          </a:p>
+        </p:txBody>
+      </p:sp>
+      <p:sp>
+        <p:nvSpPr>
+          <p:cNvPr id="10" name="Rectangle 9"/>
+          <p:cNvSpPr/>
+          <p:nvPr/>
+        </p:nvSpPr>
+        <p:spPr>
+          <a:xfrm>
+            <a:off x="3429000" y="914400"/>
+            <a:ext cx="914400" cy="914400"/>
+          </a:xfrm>
+          <a:prstGeom prst="rect">
+            <a:avLst/>
+          </a:prstGeom>
+          <a:solidFill>
+            <a:schemeClr val="accent1">
+              <a:lumMod val="40000"/>
+              <a:lumOff val="60000"/>
+            </a:schemeClr>
+          </a:solidFill>
+        </p:spPr>
+        <p:style>
+          <a:lnRef idx="2">
+            <a:schemeClr val="accent1">
+              <a:shade val="50000"/>
+            </a:schemeClr>
+          </a:lnRef>
+          <a:fillRef idx="1">
+            <a:schemeClr val="accent1"/>
+          </a:fillRef>
+          <a:effectRef idx="0">
+            <a:schemeClr val="accent1"/>
+          </a:effectRef>
+          <a:fontRef idx="minor">
+            <a:schemeClr val="lt1"/>
+          </a:fontRef>
+        </p:style>
+        <p:txBody>
+          <a:bodyPr rtlCol="0" anchor="ctr"/>
+          <a:lstStyle/>
+          <a:p>
+            <a:pPr algn="ctr"/>
+            <a:endParaRPr lang="en-US"/>
+          </a:p>
+        </p:txBody>
+      </p:sp>
+      <p:sp>
+        <p:nvSpPr>
+          <p:cNvPr id="11" name="Rectangle 10"/>
+          <p:cNvSpPr/>
+          <p:nvPr/>
+        </p:nvSpPr>
+        <p:spPr>
+          <a:xfrm>
+            <a:off x="4648200" y="914400"/>
+            <a:ext cx="914400" cy="914400"/>
+          </a:xfrm>
+          <a:prstGeom prst="rect">
+            <a:avLst/>
+          </a:prstGeom>
+          <a:solidFill>
+            <a:schemeClr val="accent1">
+              <a:lumMod val="60000"/>
+              <a:lumOff val="40000"/>
+            </a:schemeClr>
+          </a:solidFill>
+        </p:spPr>
+        <p:style>
+          <a:lnRef idx="2">
+            <a:schemeClr val="accent1">
+              <a:shade val="50000"/>
+            </a:schemeClr>
+          </a:lnRef>
+          <a:fillRef idx="1">
+            <a:schemeClr val="accent1"/>
+          </a:fillRef>
+          <a:effectRef idx="0">
+            <a:schemeClr val="accent1"/>
+          </a:effectRef>
+          <a:fontRef idx="minor">
+            <a:schemeClr val="lt1"/>
+          </a:fontRef>
+        </p:style>
+        <p:txBody>
+          <a:bodyPr rtlCol="0" anchor="ctr"/>
+          <a:lstStyle/>
+          <a:p>
+            <a:pPr algn="ctr"/>
+            <a:endParaRPr lang="en-US"/>
+          </a:p>
+        </p:txBody>
+      </p:sp>
+      <p:sp>
+        <p:nvSpPr>
+          <p:cNvPr id="12" name="Rectangle 11"/>
+          <p:cNvSpPr/>
+          <p:nvPr/>
+        </p:nvSpPr>
+        <p:spPr>
+          <a:xfrm>
+            <a:off x="5943600" y="914400"/>
+            <a:ext cx="914400" cy="914400"/>
+          </a:xfrm>
+          <a:prstGeom prst="rect">
+            <a:avLst/>
+          </a:prstGeom>
+          <a:solidFill>
+            <a:schemeClr val="accent1">
+              <a:lumMod val="75000"/>
+            </a:schemeClr>
+          </a:solidFill>
+        </p:spPr>
+        <p:style>
+          <a:lnRef idx="2">
+            <a:schemeClr val="accent1">
+              <a:shade val="50000"/>
+            </a:schemeClr>
+          </a:lnRef>
+          <a:fillRef idx="1">
+            <a:schemeClr val="accent1"/>
+          </a:fillRef>
+          <a:effectRef idx="0">
+            <a:schemeClr val="accent1"/>
+          </a:effectRef>
+          <a:fontRef idx="minor">
+            <a:schemeClr val="lt1"/>
+          </a:fontRef>
+        </p:style>
+        <p:txBody>
+          <a:bodyPr rtlCol="0" anchor="ctr"/>
+          <a:lstStyle/>
+          <a:p>
+            <a:pPr algn="ctr"/>
+            <a:endParaRPr lang="en-US"/>
+          </a:p>
+        </p:txBody>
+      </p:sp>
+      <p:sp>
+        <p:nvSpPr>
+          <p:cNvPr id="13" name="Rectangle 12"/>
+          <p:cNvSpPr/>
+          <p:nvPr/>
+        </p:nvSpPr>
+        <p:spPr>
+          <a:xfrm>
+            <a:off x="7543800" y="914400"/>
+            <a:ext cx="914400" cy="914400"/>
+          </a:xfrm>
+          <a:prstGeom prst="rect">
+            <a:avLst/>
+          </a:prstGeom>
+          <a:solidFill>
+            <a:schemeClr val="accent1">
+              <a:lumMod val="50000"/>
+            </a:schemeClr>
+          </a:solidFill>
+        </p:spPr>
+        <p:style>
+          <a:lnRef idx="2">
+            <a:schemeClr val="accent1">
+              <a:shade val="50000"/>
+            </a:schemeClr>
+          </a:lnRef>
+          <a:fillRef idx="1">
+            <a:schemeClr val="accent1"/>
+          </a:fillRef>
+          <a:effectRef idx="0">
+            <a:schemeClr val="accent1"/>
+          </a:effectRef>
+          <a:fontRef idx="minor">
+            <a:schemeClr val="lt1"/>
+          </a:fontRef>
+        </p:style>
+        <p:txBody>
+          <a:bodyPr rtlCol="0" anchor="ctr"/>
+          <a:lstStyle/>
+          <a:p>
+            <a:pPr algn="ctr"/>
+            <a:endParaRPr lang="en-US"/>
+          </a:p>
+        </p:txBody>
+      </p:sp>
+    </p:spTree>
+    <p:extLst>
+      <p:ext uri="{BB962C8B-B14F-4D97-AF65-F5344CB8AC3E}">
+        <p14:creationId xmlns:p14="http://schemas.microsoft.com/office/powerpoint/2010/main" val="2509082867"/>
+      </p:ext>
+    </p:extLst>
+  </p:cSld>
+  <p:clrMapOvr>
+    <a:masterClrMapping/>
+  </p:clrMapOvr>
+</p:sld>
+</file>
+
 <file path=ppt/theme/theme1.xml><?xml version="1.0" encoding="utf-8"?>
 <a:theme xmlns:a="http://schemas.openxmlformats.org/drawingml/2006/main" name="Office Theme">
   <a:themeElements>

</xml_diff>